<commit_message>
Quité un archivo temporal de power point
</commit_message>
<xml_diff>
--- a/Semana 2/Presentación.pptx
+++ b/Semana 2/Presentación.pptx
@@ -7785,11 +7785,7 @@
           <a:p>
             <a:r>
               <a:rPr lang="es-ES" dirty="0" smtClean="0"/>
-              <a:t>Máscara: </a:t>
-            </a:r>
-            <a:r>
-              <a:rPr lang="es-ES" dirty="0" smtClean="0"/>
-              <a:t>255.255.224.0</a:t>
+              <a:t>Máscara: 255.255.224.0</a:t>
             </a:r>
             <a:endParaRPr lang="es-CO" dirty="0"/>
           </a:p>
@@ -7825,15 +7821,7 @@
           <a:p>
             <a:r>
               <a:rPr lang="es-ES" dirty="0" smtClean="0"/>
-              <a:t>192.168.192.0 </a:t>
-            </a:r>
-            <a:r>
-              <a:rPr lang="es-ES" dirty="0" smtClean="0"/>
-              <a:t>/ </a:t>
-            </a:r>
-            <a:r>
-              <a:rPr lang="es-ES" dirty="0" smtClean="0"/>
-              <a:t>19</a:t>
+              <a:t>192.168.192.0 / 19</a:t>
             </a:r>
             <a:endParaRPr lang="es-CO" dirty="0"/>
           </a:p>
@@ -8636,11 +8624,7 @@
           <a:p>
             <a:r>
               <a:rPr lang="es-ES" dirty="0" smtClean="0"/>
-              <a:t>¿Cuál es la dirección de subred</a:t>
-            </a:r>
-            <a:r>
-              <a:rPr lang="es-ES" dirty="0" smtClean="0"/>
-              <a:t>?</a:t>
+              <a:t>¿Cuál es la dirección de subred?</a:t>
             </a:r>
             <a:endParaRPr lang="es-CO" dirty="0"/>
           </a:p>
@@ -9117,11 +9101,7 @@
           <a:p>
             <a:r>
               <a:rPr lang="es-ES" dirty="0" smtClean="0"/>
-              <a:t>Máscara: </a:t>
-            </a:r>
-            <a:r>
-              <a:rPr lang="es-ES" dirty="0" smtClean="0"/>
-              <a:t>255.255.224.0</a:t>
+              <a:t>Máscara: 255.255.224.0</a:t>
             </a:r>
             <a:endParaRPr lang="es-CO" dirty="0"/>
           </a:p>
@@ -9157,15 +9137,7 @@
           <a:p>
             <a:r>
               <a:rPr lang="es-ES" dirty="0" smtClean="0"/>
-              <a:t>192.168.192.0 </a:t>
-            </a:r>
-            <a:r>
-              <a:rPr lang="es-ES" dirty="0" smtClean="0"/>
-              <a:t>/ </a:t>
-            </a:r>
-            <a:r>
-              <a:rPr lang="es-ES" dirty="0" smtClean="0"/>
-              <a:t>19</a:t>
+              <a:t>192.168.192.0 / 19</a:t>
             </a:r>
             <a:endParaRPr lang="es-CO" dirty="0"/>
           </a:p>
@@ -9541,11 +9513,7 @@
           <a:p>
             <a:r>
               <a:rPr lang="es-ES" dirty="0" smtClean="0"/>
-              <a:t>¿Cuál es la dirección de subred</a:t>
-            </a:r>
-            <a:r>
-              <a:rPr lang="es-ES" dirty="0" smtClean="0"/>
-              <a:t>?</a:t>
+              <a:t>¿Cuál es la dirección de subred?</a:t>
             </a:r>
             <a:endParaRPr lang="es-CO" dirty="0"/>
           </a:p>
@@ -10022,11 +9990,7 @@
           <a:p>
             <a:r>
               <a:rPr lang="es-ES" dirty="0" smtClean="0"/>
-              <a:t>Máscara: </a:t>
-            </a:r>
-            <a:r>
-              <a:rPr lang="es-ES" dirty="0" smtClean="0"/>
-              <a:t>255.255.224.0</a:t>
+              <a:t>Máscara: 255.255.224.0</a:t>
             </a:r>
             <a:endParaRPr lang="es-CO" dirty="0"/>
           </a:p>
@@ -10062,15 +10026,7 @@
           <a:p>
             <a:r>
               <a:rPr lang="es-ES" dirty="0" smtClean="0"/>
-              <a:t>192.168.192.0 </a:t>
-            </a:r>
-            <a:r>
-              <a:rPr lang="es-ES" dirty="0" smtClean="0"/>
-              <a:t>/ </a:t>
-            </a:r>
-            <a:r>
-              <a:rPr lang="es-ES" dirty="0" smtClean="0"/>
-              <a:t>19</a:t>
+              <a:t>192.168.192.0 / 19</a:t>
             </a:r>
             <a:endParaRPr lang="es-CO" dirty="0"/>
           </a:p>
@@ -10516,7 +10472,7 @@
         <p:spPr>
           <a:xfrm>
             <a:off x="268615" y="3825641"/>
-            <a:ext cx="2978664" cy="1200329"/>
+            <a:ext cx="2978664" cy="1477328"/>
           </a:xfrm>
           <a:prstGeom prst="rect">
             <a:avLst/>
@@ -10535,7 +10491,23 @@
                   <a:srgbClr val="7030A0"/>
                 </a:solidFill>
               </a:rPr>
-              <a:t>Nótese que los tres primeros bytes son comunes en todas las direcciones.</a:t>
+              <a:t>Nótese que los tres primeros </a:t>
+            </a:r>
+            <a:r>
+              <a:rPr lang="es-ES" dirty="0" smtClean="0">
+                <a:solidFill>
+                  <a:srgbClr val="7030A0"/>
+                </a:solidFill>
+              </a:rPr>
+              <a:t>bits del tercer byte </a:t>
+            </a:r>
+            <a:r>
+              <a:rPr lang="es-ES" dirty="0" smtClean="0">
+                <a:solidFill>
+                  <a:srgbClr val="7030A0"/>
+                </a:solidFill>
+              </a:rPr>
+              <a:t>son comunes en todas las direcciones.</a:t>
             </a:r>
           </a:p>
           <a:p>
@@ -10594,11 +10566,7 @@
           <a:p>
             <a:r>
               <a:rPr lang="es-ES" dirty="0" smtClean="0"/>
-              <a:t>¿Cuál es la dirección de subred</a:t>
-            </a:r>
-            <a:r>
-              <a:rPr lang="es-ES" dirty="0" smtClean="0"/>
-              <a:t>?</a:t>
+              <a:t>¿Cuál es la dirección de subred?</a:t>
             </a:r>
             <a:endParaRPr lang="es-CO" dirty="0"/>
           </a:p>
@@ -11075,11 +11043,7 @@
           <a:p>
             <a:r>
               <a:rPr lang="es-ES" dirty="0" smtClean="0"/>
-              <a:t>Máscara: </a:t>
-            </a:r>
-            <a:r>
-              <a:rPr lang="es-ES" dirty="0" smtClean="0"/>
-              <a:t>255.255.224.0</a:t>
+              <a:t>Máscara: 255.255.224.0</a:t>
             </a:r>
             <a:endParaRPr lang="es-CO" dirty="0"/>
           </a:p>
@@ -11115,15 +11079,7 @@
           <a:p>
             <a:r>
               <a:rPr lang="es-ES" dirty="0" smtClean="0"/>
-              <a:t>192.168.192.0 </a:t>
-            </a:r>
-            <a:r>
-              <a:rPr lang="es-ES" dirty="0" smtClean="0"/>
-              <a:t>/ </a:t>
-            </a:r>
-            <a:r>
-              <a:rPr lang="es-ES" dirty="0" smtClean="0"/>
-              <a:t>19</a:t>
+              <a:t>192.168.192.0 / 19</a:t>
             </a:r>
             <a:endParaRPr lang="es-CO" dirty="0"/>
           </a:p>
@@ -11583,15 +11539,21 @@
           <a:lstStyle/>
           <a:p>
             <a:r>
+              <a:rPr lang="es-ES" dirty="0">
+                <a:solidFill>
+                  <a:srgbClr val="7030A0"/>
+                </a:solidFill>
+              </a:rPr>
+              <a:t>Nótese que los tres primeros bits del tercer byte son comunes en todas las direcciones</a:t>
+            </a:r>
+            <a:r>
               <a:rPr lang="es-ES" dirty="0" smtClean="0">
                 <a:solidFill>
                   <a:srgbClr val="7030A0"/>
                 </a:solidFill>
               </a:rPr>
-              <a:t>Nótese que los tres primeros bytes son comunes en todas las direcciones.</a:t>
-            </a:r>
-          </a:p>
-          <a:p>
+              <a:t>.</a:t>
+            </a:r>
             <a:endParaRPr lang="es-ES" dirty="0">
               <a:solidFill>
                 <a:srgbClr val="7030A0"/>
@@ -11672,11 +11634,7 @@
           <a:p>
             <a:r>
               <a:rPr lang="es-ES" dirty="0" smtClean="0"/>
-              <a:t>¿Cuál es la dirección de subred</a:t>
-            </a:r>
-            <a:r>
-              <a:rPr lang="es-ES" dirty="0" smtClean="0"/>
-              <a:t>?</a:t>
+              <a:t>¿Cuál es la dirección de subred?</a:t>
             </a:r>
             <a:endParaRPr lang="es-CO" dirty="0"/>
           </a:p>
@@ -12153,11 +12111,7 @@
           <a:p>
             <a:r>
               <a:rPr lang="es-ES" dirty="0" smtClean="0"/>
-              <a:t>Máscara: </a:t>
-            </a:r>
-            <a:r>
-              <a:rPr lang="es-ES" dirty="0" smtClean="0"/>
-              <a:t>255.255.224.0</a:t>
+              <a:t>Máscara: 255.255.224.0</a:t>
             </a:r>
             <a:endParaRPr lang="es-CO" dirty="0"/>
           </a:p>
@@ -12193,15 +12147,7 @@
           <a:p>
             <a:r>
               <a:rPr lang="es-ES" dirty="0" smtClean="0"/>
-              <a:t>192.168.192.0 </a:t>
-            </a:r>
-            <a:r>
-              <a:rPr lang="es-ES" dirty="0" smtClean="0"/>
-              <a:t>/ </a:t>
-            </a:r>
-            <a:r>
-              <a:rPr lang="es-ES" dirty="0" smtClean="0"/>
-              <a:t>19</a:t>
+              <a:t>192.168.192.0 / 19</a:t>
             </a:r>
             <a:endParaRPr lang="es-CO" dirty="0"/>
           </a:p>

</xml_diff>